<commit_message>
Add WBS & some update
</commit_message>
<xml_diff>
--- a/(주)형경산업_스마트 팩토리 개발 및 구현.pptx
+++ b/(주)형경산업_스마트 팩토리 개발 및 구현.pptx
@@ -2,7 +2,7 @@
 <file path=ppt/presentation.xml><?xml version="1.0" encoding="utf-8"?>
 <p:presentation xmlns:a="http://schemas.openxmlformats.org/drawingml/2006/main" xmlns:r="http://schemas.openxmlformats.org/officeDocument/2006/relationships" xmlns:p="http://schemas.openxmlformats.org/presentationml/2006/main" saveSubsetFonts="1">
   <p:sldMasterIdLst>
-    <p:sldMasterId id="2147483892" r:id="rId1"/>
+    <p:sldMasterId id="2147483928" r:id="rId1"/>
   </p:sldMasterIdLst>
   <p:notesMasterIdLst>
     <p:notesMasterId r:id="rId16"/>
@@ -123,6 +123,9 @@
   <p:extLst>
     <p:ext uri="{EFAFB233-063F-42B5-8137-9DF3F51BA10A}">
       <p15:sldGuideLst xmlns:p15="http://schemas.microsoft.com/office/powerpoint/2012/main"/>
+    </p:ext>
+    <p:ext uri="{2D200454-40CA-4A62-9FC3-DE9A4176ACB9}">
+      <p15:notesGuideLst xmlns:p15="http://schemas.microsoft.com/office/powerpoint/2012/main"/>
     </p:ext>
   </p:extLst>
 </p:presentation>
@@ -2221,7 +2224,7 @@
             <a:lumMod val="75000"/>
           </a:schemeClr>
         </a:solidFill>
-        <a:ln w="40000" cap="flat" cmpd="sng" algn="ctr">
+        <a:ln w="15875" cap="rnd" cmpd="sng" algn="ctr">
           <a:solidFill>
             <a:schemeClr val="lt1">
               <a:hueOff val="0"/>
@@ -2370,7 +2373,7 @@
             <a:lumMod val="75000"/>
           </a:schemeClr>
         </a:solidFill>
-        <a:ln w="40000" cap="flat" cmpd="sng" algn="ctr">
+        <a:ln w="15875" cap="rnd" cmpd="sng" algn="ctr">
           <a:solidFill>
             <a:schemeClr val="lt1">
               <a:hueOff val="0"/>
@@ -2517,7 +2520,7 @@
         <a:solidFill>
           <a:srgbClr val="0070C0"/>
         </a:solidFill>
-        <a:ln w="40000" cap="flat" cmpd="sng" algn="ctr">
+        <a:ln w="15875" cap="rnd" cmpd="sng" algn="ctr">
           <a:solidFill>
             <a:schemeClr val="lt1">
               <a:hueOff val="0"/>
@@ -2664,7 +2667,7 @@
         <a:solidFill>
           <a:srgbClr val="7030A0"/>
         </a:solidFill>
-        <a:ln w="40000" cap="flat" cmpd="sng" algn="ctr">
+        <a:ln w="15875" cap="rnd" cmpd="sng" algn="ctr">
           <a:solidFill>
             <a:schemeClr val="lt1">
               <a:hueOff val="0"/>
@@ -2816,7 +2819,7 @@
         <a:solidFill>
           <a:srgbClr val="7030A0"/>
         </a:solidFill>
-        <a:ln w="40000" cap="flat" cmpd="sng" algn="ctr">
+        <a:ln w="15875" cap="rnd" cmpd="sng" algn="ctr">
           <a:solidFill>
             <a:schemeClr val="lt1">
               <a:hueOff val="0"/>
@@ -2968,7 +2971,7 @@
         <a:solidFill>
           <a:srgbClr val="7030A0"/>
         </a:solidFill>
-        <a:ln w="40000" cap="flat" cmpd="sng" algn="ctr">
+        <a:ln w="15875" cap="rnd" cmpd="sng" algn="ctr">
           <a:solidFill>
             <a:schemeClr val="lt1">
               <a:hueOff val="0"/>
@@ -3120,7 +3123,7 @@
         <a:solidFill>
           <a:srgbClr val="0070C0"/>
         </a:solidFill>
-        <a:ln w="40000" cap="flat" cmpd="sng" algn="ctr">
+        <a:ln w="15875" cap="rnd" cmpd="sng" algn="ctr">
           <a:solidFill>
             <a:schemeClr val="lt1">
               <a:hueOff val="0"/>
@@ -3266,7 +3269,7 @@
         <a:solidFill>
           <a:srgbClr val="0070C0"/>
         </a:solidFill>
-        <a:ln w="40000" cap="flat" cmpd="sng" algn="ctr">
+        <a:ln w="15875" cap="rnd" cmpd="sng" algn="ctr">
           <a:solidFill>
             <a:schemeClr val="lt1">
               <a:hueOff val="0"/>
@@ -3412,7 +3415,7 @@
         <a:solidFill>
           <a:srgbClr val="0070C0"/>
         </a:solidFill>
-        <a:ln w="40000" cap="flat" cmpd="sng" algn="ctr">
+        <a:ln w="15875" cap="rnd" cmpd="sng" algn="ctr">
           <a:solidFill>
             <a:schemeClr val="lt1">
               <a:hueOff val="0"/>
@@ -3558,7 +3561,7 @@
         <a:solidFill>
           <a:srgbClr val="0070C0"/>
         </a:solidFill>
-        <a:ln w="40000" cap="flat" cmpd="sng" algn="ctr">
+        <a:ln w="15875" cap="rnd" cmpd="sng" algn="ctr">
           <a:solidFill>
             <a:schemeClr val="lt1">
               <a:hueOff val="0"/>
@@ -3706,7 +3709,7 @@
             <a:lumMod val="75000"/>
           </a:schemeClr>
         </a:solidFill>
-        <a:ln w="40000" cap="flat" cmpd="sng" algn="ctr">
+        <a:ln w="15875" cap="rnd" cmpd="sng" algn="ctr">
           <a:solidFill>
             <a:schemeClr val="lt1">
               <a:hueOff val="0"/>
@@ -3854,7 +3857,7 @@
             <a:lumMod val="75000"/>
           </a:schemeClr>
         </a:solidFill>
-        <a:ln w="40000" cap="flat" cmpd="sng" algn="ctr">
+        <a:ln w="15875" cap="rnd" cmpd="sng" algn="ctr">
           <a:solidFill>
             <a:schemeClr val="lt1">
               <a:hueOff val="0"/>
@@ -5235,7 +5238,7 @@
           <a:p>
             <a:fld id="{0C24E8B0-70D4-4671-AC7C-D0D9D7413F39}" type="datetimeFigureOut">
               <a:rPr lang="ko-KR" altLang="en-US" smtClean="0"/>
-              <a:t>2026-02-06</a:t>
+              <a:t>2026-02-23</a:t>
             </a:fld>
             <a:endParaRPr lang="ko-KR" altLang="en-US"/>
           </a:p>
@@ -5862,7 +5865,7 @@
           <a:p>
             <a:fld id="{F60A9B89-B893-4EAB-B4B7-A6CBBBBD2CBB}" type="datetimeFigureOut">
               <a:rPr lang="ko-KR" altLang="en-US" smtClean="0"/>
-              <a:t>2026-02-06</a:t>
+              <a:t>2026-02-23</a:t>
             </a:fld>
             <a:endParaRPr lang="ko-KR" altLang="en-US"/>
           </a:p>
@@ -6088,7 +6091,7 @@
     </p:spTree>
     <p:extLst>
       <p:ext uri="{BB962C8B-B14F-4D97-AF65-F5344CB8AC3E}">
-        <p14:creationId xmlns:p14="http://schemas.microsoft.com/office/powerpoint/2010/main" val="2074921036"/>
+        <p14:creationId xmlns:p14="http://schemas.microsoft.com/office/powerpoint/2010/main" val="2048464526"/>
       </p:ext>
     </p:extLst>
   </p:cSld>
@@ -6298,7 +6301,7 @@
           <a:p>
             <a:fld id="{F60A9B89-B893-4EAB-B4B7-A6CBBBBD2CBB}" type="datetimeFigureOut">
               <a:rPr lang="ko-KR" altLang="en-US" smtClean="0"/>
-              <a:t>2026-02-06</a:t>
+              <a:t>2026-02-23</a:t>
             </a:fld>
             <a:endParaRPr lang="ko-KR" altLang="en-US"/>
           </a:p>
@@ -6349,7 +6352,7 @@
     </p:spTree>
     <p:extLst>
       <p:ext uri="{BB962C8B-B14F-4D97-AF65-F5344CB8AC3E}">
-        <p14:creationId xmlns:p14="http://schemas.microsoft.com/office/powerpoint/2010/main" val="4282131653"/>
+        <p14:creationId xmlns:p14="http://schemas.microsoft.com/office/powerpoint/2010/main" val="3574931342"/>
       </p:ext>
     </p:extLst>
   </p:cSld>
@@ -6548,7 +6551,7 @@
           <a:p>
             <a:fld id="{F60A9B89-B893-4EAB-B4B7-A6CBBBBD2CBB}" type="datetimeFigureOut">
               <a:rPr lang="ko-KR" altLang="en-US" smtClean="0"/>
-              <a:t>2026-02-06</a:t>
+              <a:t>2026-02-23</a:t>
             </a:fld>
             <a:endParaRPr lang="ko-KR" altLang="en-US"/>
           </a:p>
@@ -6599,7 +6602,7 @@
     </p:spTree>
     <p:extLst>
       <p:ext uri="{BB962C8B-B14F-4D97-AF65-F5344CB8AC3E}">
-        <p14:creationId xmlns:p14="http://schemas.microsoft.com/office/powerpoint/2010/main" val="938651553"/>
+        <p14:creationId xmlns:p14="http://schemas.microsoft.com/office/powerpoint/2010/main" val="2189511698"/>
       </p:ext>
     </p:extLst>
   </p:cSld>
@@ -6856,7 +6859,7 @@
           <a:p>
             <a:fld id="{F60A9B89-B893-4EAB-B4B7-A6CBBBBD2CBB}" type="datetimeFigureOut">
               <a:rPr lang="ko-KR" altLang="en-US" smtClean="0"/>
-              <a:t>2026-02-06</a:t>
+              <a:t>2026-02-23</a:t>
             </a:fld>
             <a:endParaRPr lang="ko-KR" altLang="en-US"/>
           </a:p>
@@ -6975,7 +6978,7 @@
     </p:spTree>
     <p:extLst>
       <p:ext uri="{BB962C8B-B14F-4D97-AF65-F5344CB8AC3E}">
-        <p14:creationId xmlns:p14="http://schemas.microsoft.com/office/powerpoint/2010/main" val="780307598"/>
+        <p14:creationId xmlns:p14="http://schemas.microsoft.com/office/powerpoint/2010/main" val="989133947"/>
       </p:ext>
     </p:extLst>
   </p:cSld>
@@ -7174,7 +7177,7 @@
           <a:p>
             <a:fld id="{F60A9B89-B893-4EAB-B4B7-A6CBBBBD2CBB}" type="datetimeFigureOut">
               <a:rPr lang="ko-KR" altLang="en-US" smtClean="0"/>
-              <a:t>2026-02-06</a:t>
+              <a:t>2026-02-23</a:t>
             </a:fld>
             <a:endParaRPr lang="ko-KR" altLang="en-US"/>
           </a:p>
@@ -7225,7 +7228,7 @@
     </p:spTree>
     <p:extLst>
       <p:ext uri="{BB962C8B-B14F-4D97-AF65-F5344CB8AC3E}">
-        <p14:creationId xmlns:p14="http://schemas.microsoft.com/office/powerpoint/2010/main" val="3590882448"/>
+        <p14:creationId xmlns:p14="http://schemas.microsoft.com/office/powerpoint/2010/main" val="1993612593"/>
       </p:ext>
     </p:extLst>
   </p:cSld>
@@ -7476,7 +7479,7 @@
           <a:p>
             <a:fld id="{F60A9B89-B893-4EAB-B4B7-A6CBBBBD2CBB}" type="datetimeFigureOut">
               <a:rPr lang="ko-KR" altLang="en-US" smtClean="0"/>
-              <a:t>2026-02-06</a:t>
+              <a:t>2026-02-23</a:t>
             </a:fld>
             <a:endParaRPr lang="ko-KR" altLang="en-US"/>
           </a:p>
@@ -7595,7 +7598,7 @@
     </p:spTree>
     <p:extLst>
       <p:ext uri="{BB962C8B-B14F-4D97-AF65-F5344CB8AC3E}">
-        <p14:creationId xmlns:p14="http://schemas.microsoft.com/office/powerpoint/2010/main" val="1177301273"/>
+        <p14:creationId xmlns:p14="http://schemas.microsoft.com/office/powerpoint/2010/main" val="3986900324"/>
       </p:ext>
     </p:extLst>
   </p:cSld>
@@ -7843,7 +7846,7 @@
           <a:p>
             <a:fld id="{F60A9B89-B893-4EAB-B4B7-A6CBBBBD2CBB}" type="datetimeFigureOut">
               <a:rPr lang="ko-KR" altLang="en-US" smtClean="0"/>
-              <a:t>2026-02-06</a:t>
+              <a:t>2026-02-23</a:t>
             </a:fld>
             <a:endParaRPr lang="ko-KR" altLang="en-US"/>
           </a:p>
@@ -7894,7 +7897,7 @@
     </p:spTree>
     <p:extLst>
       <p:ext uri="{BB962C8B-B14F-4D97-AF65-F5344CB8AC3E}">
-        <p14:creationId xmlns:p14="http://schemas.microsoft.com/office/powerpoint/2010/main" val="1214639707"/>
+        <p14:creationId xmlns:p14="http://schemas.microsoft.com/office/powerpoint/2010/main" val="427191605"/>
       </p:ext>
     </p:extLst>
   </p:cSld>
@@ -8017,7 +8020,7 @@
           <a:p>
             <a:fld id="{F60A9B89-B893-4EAB-B4B7-A6CBBBBD2CBB}" type="datetimeFigureOut">
               <a:rPr lang="ko-KR" altLang="en-US" smtClean="0"/>
-              <a:t>2026-02-06</a:t>
+              <a:t>2026-02-23</a:t>
             </a:fld>
             <a:endParaRPr lang="ko-KR" altLang="en-US"/>
           </a:p>
@@ -8068,7 +8071,7 @@
     </p:spTree>
     <p:extLst>
       <p:ext uri="{BB962C8B-B14F-4D97-AF65-F5344CB8AC3E}">
-        <p14:creationId xmlns:p14="http://schemas.microsoft.com/office/powerpoint/2010/main" val="3681853206"/>
+        <p14:creationId xmlns:p14="http://schemas.microsoft.com/office/powerpoint/2010/main" val="2769848184"/>
       </p:ext>
     </p:extLst>
   </p:cSld>
@@ -8197,7 +8200,7 @@
           <a:p>
             <a:fld id="{F60A9B89-B893-4EAB-B4B7-A6CBBBBD2CBB}" type="datetimeFigureOut">
               <a:rPr lang="ko-KR" altLang="en-US" smtClean="0"/>
-              <a:t>2026-02-06</a:t>
+              <a:t>2026-02-23</a:t>
             </a:fld>
             <a:endParaRPr lang="ko-KR" altLang="en-US"/>
           </a:p>
@@ -8248,7 +8251,7 @@
     </p:spTree>
     <p:extLst>
       <p:ext uri="{BB962C8B-B14F-4D97-AF65-F5344CB8AC3E}">
-        <p14:creationId xmlns:p14="http://schemas.microsoft.com/office/powerpoint/2010/main" val="369594834"/>
+        <p14:creationId xmlns:p14="http://schemas.microsoft.com/office/powerpoint/2010/main" val="3309394966"/>
       </p:ext>
     </p:extLst>
   </p:cSld>
@@ -8367,7 +8370,7 @@
           <a:p>
             <a:fld id="{F60A9B89-B893-4EAB-B4B7-A6CBBBBD2CBB}" type="datetimeFigureOut">
               <a:rPr lang="ko-KR" altLang="en-US" smtClean="0"/>
-              <a:t>2026-02-06</a:t>
+              <a:t>2026-02-23</a:t>
             </a:fld>
             <a:endParaRPr lang="ko-KR" altLang="en-US"/>
           </a:p>
@@ -8448,7 +8451,7 @@
     </p:spTree>
     <p:extLst>
       <p:ext uri="{BB962C8B-B14F-4D97-AF65-F5344CB8AC3E}">
-        <p14:creationId xmlns:p14="http://schemas.microsoft.com/office/powerpoint/2010/main" val="1786313444"/>
+        <p14:creationId xmlns:p14="http://schemas.microsoft.com/office/powerpoint/2010/main" val="272671828"/>
       </p:ext>
     </p:extLst>
   </p:cSld>
@@ -8647,7 +8650,7 @@
           <a:p>
             <a:fld id="{F60A9B89-B893-4EAB-B4B7-A6CBBBBD2CBB}" type="datetimeFigureOut">
               <a:rPr lang="ko-KR" altLang="en-US" smtClean="0"/>
-              <a:t>2026-02-06</a:t>
+              <a:t>2026-02-23</a:t>
             </a:fld>
             <a:endParaRPr lang="ko-KR" altLang="en-US"/>
           </a:p>
@@ -8698,7 +8701,7 @@
     </p:spTree>
     <p:extLst>
       <p:ext uri="{BB962C8B-B14F-4D97-AF65-F5344CB8AC3E}">
-        <p14:creationId xmlns:p14="http://schemas.microsoft.com/office/powerpoint/2010/main" val="1989923034"/>
+        <p14:creationId xmlns:p14="http://schemas.microsoft.com/office/powerpoint/2010/main" val="2760283529"/>
       </p:ext>
     </p:extLst>
   </p:cSld>
@@ -8883,7 +8886,7 @@
           <a:p>
             <a:fld id="{F60A9B89-B893-4EAB-B4B7-A6CBBBBD2CBB}" type="datetimeFigureOut">
               <a:rPr lang="ko-KR" altLang="en-US" smtClean="0"/>
-              <a:t>2026-02-06</a:t>
+              <a:t>2026-02-23</a:t>
             </a:fld>
             <a:endParaRPr lang="ko-KR" altLang="en-US"/>
           </a:p>
@@ -8934,7 +8937,7 @@
     </p:spTree>
     <p:extLst>
       <p:ext uri="{BB962C8B-B14F-4D97-AF65-F5344CB8AC3E}">
-        <p14:creationId xmlns:p14="http://schemas.microsoft.com/office/powerpoint/2010/main" val="1491460611"/>
+        <p14:creationId xmlns:p14="http://schemas.microsoft.com/office/powerpoint/2010/main" val="1764585678"/>
       </p:ext>
     </p:extLst>
   </p:cSld>
@@ -9265,7 +9268,7 @@
           <a:p>
             <a:fld id="{F60A9B89-B893-4EAB-B4B7-A6CBBBBD2CBB}" type="datetimeFigureOut">
               <a:rPr lang="ko-KR" altLang="en-US" smtClean="0"/>
-              <a:t>2026-02-06</a:t>
+              <a:t>2026-02-23</a:t>
             </a:fld>
             <a:endParaRPr lang="ko-KR" altLang="en-US"/>
           </a:p>
@@ -9316,7 +9319,7 @@
     </p:spTree>
     <p:extLst>
       <p:ext uri="{BB962C8B-B14F-4D97-AF65-F5344CB8AC3E}">
-        <p14:creationId xmlns:p14="http://schemas.microsoft.com/office/powerpoint/2010/main" val="3679068076"/>
+        <p14:creationId xmlns:p14="http://schemas.microsoft.com/office/powerpoint/2010/main" val="443010874"/>
       </p:ext>
     </p:extLst>
   </p:cSld>
@@ -9383,7 +9386,7 @@
           <a:p>
             <a:fld id="{F60A9B89-B893-4EAB-B4B7-A6CBBBBD2CBB}" type="datetimeFigureOut">
               <a:rPr lang="ko-KR" altLang="en-US" smtClean="0"/>
-              <a:t>2026-02-06</a:t>
+              <a:t>2026-02-23</a:t>
             </a:fld>
             <a:endParaRPr lang="ko-KR" altLang="en-US"/>
           </a:p>
@@ -9434,7 +9437,7 @@
     </p:spTree>
     <p:extLst>
       <p:ext uri="{BB962C8B-B14F-4D97-AF65-F5344CB8AC3E}">
-        <p14:creationId xmlns:p14="http://schemas.microsoft.com/office/powerpoint/2010/main" val="3149797868"/>
+        <p14:creationId xmlns:p14="http://schemas.microsoft.com/office/powerpoint/2010/main" val="2543528932"/>
       </p:ext>
     </p:extLst>
   </p:cSld>
@@ -9478,7 +9481,7 @@
           <a:p>
             <a:fld id="{F60A9B89-B893-4EAB-B4B7-A6CBBBBD2CBB}" type="datetimeFigureOut">
               <a:rPr lang="ko-KR" altLang="en-US" smtClean="0"/>
-              <a:t>2026-02-06</a:t>
+              <a:t>2026-02-23</a:t>
             </a:fld>
             <a:endParaRPr lang="ko-KR" altLang="en-US"/>
           </a:p>
@@ -9529,7 +9532,7 @@
     </p:spTree>
     <p:extLst>
       <p:ext uri="{BB962C8B-B14F-4D97-AF65-F5344CB8AC3E}">
-        <p14:creationId xmlns:p14="http://schemas.microsoft.com/office/powerpoint/2010/main" val="3645201321"/>
+        <p14:creationId xmlns:p14="http://schemas.microsoft.com/office/powerpoint/2010/main" val="2276385448"/>
       </p:ext>
     </p:extLst>
   </p:cSld>
@@ -9733,7 +9736,7 @@
           <a:p>
             <a:fld id="{F60A9B89-B893-4EAB-B4B7-A6CBBBBD2CBB}" type="datetimeFigureOut">
               <a:rPr lang="ko-KR" altLang="en-US" smtClean="0"/>
-              <a:t>2026-02-06</a:t>
+              <a:t>2026-02-23</a:t>
             </a:fld>
             <a:endParaRPr lang="ko-KR" altLang="en-US"/>
           </a:p>
@@ -9784,7 +9787,7 @@
     </p:spTree>
     <p:extLst>
       <p:ext uri="{BB962C8B-B14F-4D97-AF65-F5344CB8AC3E}">
-        <p14:creationId xmlns:p14="http://schemas.microsoft.com/office/powerpoint/2010/main" val="144117788"/>
+        <p14:creationId xmlns:p14="http://schemas.microsoft.com/office/powerpoint/2010/main" val="2444977299"/>
       </p:ext>
     </p:extLst>
   </p:cSld>
@@ -10016,7 +10019,7 @@
           <a:p>
             <a:fld id="{F60A9B89-B893-4EAB-B4B7-A6CBBBBD2CBB}" type="datetimeFigureOut">
               <a:rPr lang="ko-KR" altLang="en-US" smtClean="0"/>
-              <a:t>2026-02-06</a:t>
+              <a:t>2026-02-23</a:t>
             </a:fld>
             <a:endParaRPr lang="ko-KR" altLang="en-US"/>
           </a:p>
@@ -10067,7 +10070,7 @@
     </p:spTree>
     <p:extLst>
       <p:ext uri="{BB962C8B-B14F-4D97-AF65-F5344CB8AC3E}">
-        <p14:creationId xmlns:p14="http://schemas.microsoft.com/office/powerpoint/2010/main" val="2487098222"/>
+        <p14:creationId xmlns:p14="http://schemas.microsoft.com/office/powerpoint/2010/main" val="2555401368"/>
       </p:ext>
     </p:extLst>
   </p:cSld>
@@ -10422,7 +10425,7 @@
           <a:p>
             <a:fld id="{F60A9B89-B893-4EAB-B4B7-A6CBBBBD2CBB}" type="datetimeFigureOut">
               <a:rPr lang="ko-KR" altLang="en-US" smtClean="0"/>
-              <a:t>2026-02-06</a:t>
+              <a:t>2026-02-23</a:t>
             </a:fld>
             <a:endParaRPr lang="ko-KR" altLang="en-US"/>
           </a:p>
@@ -10513,29 +10516,29 @@
     </p:spTree>
     <p:extLst>
       <p:ext uri="{BB962C8B-B14F-4D97-AF65-F5344CB8AC3E}">
-        <p14:creationId xmlns:p14="http://schemas.microsoft.com/office/powerpoint/2010/main" val="2554428928"/>
+        <p14:creationId xmlns:p14="http://schemas.microsoft.com/office/powerpoint/2010/main" val="3855059286"/>
       </p:ext>
     </p:extLst>
   </p:cSld>
   <p:clrMap bg1="dk1" tx1="lt1" bg2="dk2" tx2="lt2" accent1="accent1" accent2="accent2" accent3="accent3" accent4="accent4" accent5="accent5" accent6="accent6" hlink="hlink" folHlink="folHlink"/>
   <p:sldLayoutIdLst>
-    <p:sldLayoutId id="2147483893" r:id="rId1"/>
-    <p:sldLayoutId id="2147483894" r:id="rId2"/>
-    <p:sldLayoutId id="2147483895" r:id="rId3"/>
-    <p:sldLayoutId id="2147483896" r:id="rId4"/>
-    <p:sldLayoutId id="2147483897" r:id="rId5"/>
-    <p:sldLayoutId id="2147483898" r:id="rId6"/>
-    <p:sldLayoutId id="2147483899" r:id="rId7"/>
-    <p:sldLayoutId id="2147483900" r:id="rId8"/>
-    <p:sldLayoutId id="2147483901" r:id="rId9"/>
-    <p:sldLayoutId id="2147483902" r:id="rId10"/>
-    <p:sldLayoutId id="2147483903" r:id="rId11"/>
-    <p:sldLayoutId id="2147483904" r:id="rId12"/>
-    <p:sldLayoutId id="2147483905" r:id="rId13"/>
-    <p:sldLayoutId id="2147483906" r:id="rId14"/>
-    <p:sldLayoutId id="2147483907" r:id="rId15"/>
-    <p:sldLayoutId id="2147483908" r:id="rId16"/>
-    <p:sldLayoutId id="2147483909" r:id="rId17"/>
+    <p:sldLayoutId id="2147483929" r:id="rId1"/>
+    <p:sldLayoutId id="2147483930" r:id="rId2"/>
+    <p:sldLayoutId id="2147483931" r:id="rId3"/>
+    <p:sldLayoutId id="2147483932" r:id="rId4"/>
+    <p:sldLayoutId id="2147483933" r:id="rId5"/>
+    <p:sldLayoutId id="2147483934" r:id="rId6"/>
+    <p:sldLayoutId id="2147483935" r:id="rId7"/>
+    <p:sldLayoutId id="2147483936" r:id="rId8"/>
+    <p:sldLayoutId id="2147483937" r:id="rId9"/>
+    <p:sldLayoutId id="2147483938" r:id="rId10"/>
+    <p:sldLayoutId id="2147483939" r:id="rId11"/>
+    <p:sldLayoutId id="2147483940" r:id="rId12"/>
+    <p:sldLayoutId id="2147483941" r:id="rId13"/>
+    <p:sldLayoutId id="2147483942" r:id="rId14"/>
+    <p:sldLayoutId id="2147483943" r:id="rId15"/>
+    <p:sldLayoutId id="2147483944" r:id="rId16"/>
+    <p:sldLayoutId id="2147483945" r:id="rId17"/>
   </p:sldLayoutIdLst>
   <p:txStyles>
     <p:titleStyle>
@@ -10997,17 +11000,7 @@
                 <a:latin typeface="Noto Sans KR SemiBold" panose="020B0200000000000000" pitchFamily="50" charset="-127"/>
                 <a:ea typeface="Noto Sans KR SemiBold" panose="020B0200000000000000" pitchFamily="50" charset="-127"/>
               </a:rPr>
-              <a:t>스마트 </a:t>
-            </a:r>
-            <a:r>
-              <a:rPr lang="ko-KR" altLang="en-US" sz="4400" b="1" dirty="0" smtClean="0">
-                <a:solidFill>
-                  <a:srgbClr val="002060"/>
-                </a:solidFill>
-                <a:latin typeface="Noto Sans KR SemiBold" panose="020B0200000000000000" pitchFamily="50" charset="-127"/>
-                <a:ea typeface="Noto Sans KR SemiBold" panose="020B0200000000000000" pitchFamily="50" charset="-127"/>
-              </a:rPr>
-              <a:t>팩토리 개발 및 구현</a:t>
+              <a:t>스마트 팩토리 개발 및 구현</a:t>
             </a:r>
             <a:endParaRPr lang="ko-KR" altLang="en-US" sz="4400" b="1" dirty="0">
               <a:solidFill>
@@ -11049,17 +11042,7 @@
                 <a:latin typeface="Noto Sans KR SemiBold" panose="020B0200000000000000" pitchFamily="50" charset="-127"/>
                 <a:ea typeface="Noto Sans KR SemiBold" panose="020B0200000000000000" pitchFamily="50" charset="-127"/>
               </a:rPr>
-              <a:t>Revision </a:t>
-            </a:r>
-            <a:r>
-              <a:rPr lang="en-US" altLang="ko-KR" sz="2000" b="1" dirty="0" smtClean="0">
-                <a:solidFill>
-                  <a:srgbClr val="002060"/>
-                </a:solidFill>
-                <a:latin typeface="Noto Sans KR SemiBold" panose="020B0200000000000000" pitchFamily="50" charset="-127"/>
-                <a:ea typeface="Noto Sans KR SemiBold" panose="020B0200000000000000" pitchFamily="50" charset="-127"/>
-              </a:rPr>
-              <a:t>0.4</a:t>
+              <a:t>Revision 0.4</a:t>
             </a:r>
             <a:endParaRPr lang="ko-KR" altLang="en-US" sz="2000" b="1" dirty="0">
               <a:solidFill>
@@ -11199,7 +11182,7 @@
         <p:spPr>
           <a:xfrm>
             <a:off x="1092495" y="505480"/>
-            <a:ext cx="8232479" cy="6093976"/>
+            <a:ext cx="8232479" cy="4154984"/>
           </a:xfrm>
           <a:prstGeom prst="rect">
             <a:avLst/>
@@ -11623,7 +11606,19 @@
                 <a:latin typeface="Noto Sans KR SemiBold" panose="020B0200000000000000" pitchFamily="50" charset="-127"/>
                 <a:ea typeface="Noto Sans KR SemiBold" panose="020B0200000000000000" pitchFamily="50" charset="-127"/>
               </a:rPr>
-              <a:t>(X)</a:t>
+              <a:t>(X</a:t>
+            </a:r>
+            <a:r>
+              <a:rPr lang="en-US" altLang="ko-KR" dirty="0" smtClean="0">
+                <a:solidFill>
+                  <a:schemeClr val="accent1">
+                    <a:lumMod val="50000"/>
+                  </a:schemeClr>
+                </a:solidFill>
+                <a:latin typeface="Noto Sans KR SemiBold" panose="020B0200000000000000" pitchFamily="50" charset="-127"/>
+                <a:ea typeface="Noto Sans KR SemiBold" panose="020B0200000000000000" pitchFamily="50" charset="-127"/>
+              </a:rPr>
+              <a:t>)</a:t>
             </a:r>
           </a:p>
           <a:p>
@@ -11632,81 +11627,66 @@
             </a:pPr>
             <a:endParaRPr lang="en-US" altLang="ko-KR" dirty="0">
               <a:solidFill>
-                <a:srgbClr val="92D050"/>
+                <a:schemeClr val="accent1">
+                  <a:lumMod val="50000"/>
+                </a:schemeClr>
               </a:solidFill>
-            </a:endParaRPr>
-          </a:p>
-          <a:p>
-            <a:endParaRPr lang="en-US" altLang="ko-KR" dirty="0">
-              <a:solidFill>
-                <a:srgbClr val="92D050"/>
-              </a:solidFill>
+              <a:latin typeface="Noto Sans KR SemiBold" panose="020B0200000000000000" pitchFamily="50" charset="-127"/>
+              <a:ea typeface="Noto Sans KR SemiBold" panose="020B0200000000000000" pitchFamily="50" charset="-127"/>
             </a:endParaRPr>
           </a:p>
           <a:p>
             <a:pPr marL="342900" indent="-342900">
               <a:buAutoNum type="arabicParenR"/>
             </a:pPr>
-            <a:endParaRPr lang="en-US" altLang="ko-KR" dirty="0" smtClean="0">
-              <a:solidFill>
-                <a:srgbClr val="92D050"/>
-              </a:solidFill>
-            </a:endParaRPr>
-          </a:p>
-          <a:p>
-            <a:pPr marL="342900" indent="-342900">
-              <a:buAutoNum type="arabicParenR"/>
-            </a:pPr>
-            <a:endParaRPr lang="en-US" altLang="ko-KR" dirty="0">
-              <a:solidFill>
-                <a:srgbClr val="92D050"/>
-              </a:solidFill>
-            </a:endParaRPr>
-          </a:p>
-          <a:p>
-            <a:pPr marL="342900" indent="-342900">
-              <a:buAutoNum type="arabicParenR"/>
-            </a:pPr>
-            <a:endParaRPr lang="en-US" altLang="ko-KR" dirty="0">
-              <a:solidFill>
-                <a:srgbClr val="92D050"/>
-              </a:solidFill>
-            </a:endParaRPr>
-          </a:p>
-          <a:p>
-            <a:pPr marL="342900" indent="-342900">
-              <a:buAutoNum type="arabicParenR"/>
-            </a:pPr>
-            <a:endParaRPr lang="en-US" altLang="ko-KR" dirty="0">
-              <a:solidFill>
-                <a:srgbClr val="92D050"/>
-              </a:solidFill>
-            </a:endParaRPr>
-          </a:p>
-          <a:p>
-            <a:pPr marL="342900" indent="-342900">
-              <a:buAutoNum type="arabicParenR"/>
-            </a:pPr>
-            <a:endParaRPr lang="en-US" altLang="ko-KR" dirty="0" smtClean="0">
-              <a:solidFill>
-                <a:srgbClr val="92D050"/>
-              </a:solidFill>
-            </a:endParaRPr>
-          </a:p>
-          <a:p>
-            <a:pPr marL="342900" indent="-342900">
-              <a:buAutoNum type="arabicParenR"/>
-            </a:pPr>
-            <a:endParaRPr lang="en-US" altLang="ko-KR" dirty="0" smtClean="0">
-              <a:solidFill>
-                <a:srgbClr val="92D050"/>
-              </a:solidFill>
-            </a:endParaRPr>
-          </a:p>
-          <a:p>
-            <a:pPr marL="342900" indent="-342900">
-              <a:buAutoNum type="arabicParenR"/>
-            </a:pPr>
+            <a:r>
+              <a:rPr lang="ko-KR" altLang="en-US" dirty="0" smtClean="0">
+                <a:solidFill>
+                  <a:schemeClr val="accent1">
+                    <a:lumMod val="50000"/>
+                  </a:schemeClr>
+                </a:solidFill>
+                <a:latin typeface="Noto Sans KR SemiBold" panose="020B0200000000000000" pitchFamily="50" charset="-127"/>
+                <a:ea typeface="Noto Sans KR SemiBold" panose="020B0200000000000000" pitchFamily="50" charset="-127"/>
+              </a:rPr>
+              <a:t>각 공정 후 가공된 자재의 효율적</a:t>
+            </a:r>
+            <a:r>
+              <a:rPr lang="en-US" altLang="ko-KR" dirty="0" smtClean="0">
+                <a:solidFill>
+                  <a:schemeClr val="accent1">
+                    <a:lumMod val="50000"/>
+                  </a:schemeClr>
+                </a:solidFill>
+                <a:latin typeface="Noto Sans KR SemiBold" panose="020B0200000000000000" pitchFamily="50" charset="-127"/>
+                <a:ea typeface="Noto Sans KR SemiBold" panose="020B0200000000000000" pitchFamily="50" charset="-127"/>
+              </a:rPr>
+              <a:t> </a:t>
+            </a:r>
+            <a:r>
+              <a:rPr lang="ko-KR" altLang="en-US" dirty="0" smtClean="0">
+                <a:solidFill>
+                  <a:schemeClr val="accent1">
+                    <a:lumMod val="50000"/>
+                  </a:schemeClr>
+                </a:solidFill>
+                <a:latin typeface="Noto Sans KR SemiBold" panose="020B0200000000000000" pitchFamily="50" charset="-127"/>
+                <a:ea typeface="Noto Sans KR SemiBold" panose="020B0200000000000000" pitchFamily="50" charset="-127"/>
+              </a:rPr>
+              <a:t>품질 검사 방법 </a:t>
+            </a:r>
+            <a:r>
+              <a:rPr lang="en-US" altLang="ko-KR" dirty="0" smtClean="0">
+                <a:solidFill>
+                  <a:schemeClr val="accent1">
+                    <a:lumMod val="50000"/>
+                  </a:schemeClr>
+                </a:solidFill>
+                <a:latin typeface="Noto Sans KR SemiBold" panose="020B0200000000000000" pitchFamily="50" charset="-127"/>
+                <a:ea typeface="Noto Sans KR SemiBold" panose="020B0200000000000000" pitchFamily="50" charset="-127"/>
+              </a:rPr>
+              <a:t>(X)</a:t>
+            </a:r>
             <a:endParaRPr lang="en-US" altLang="ko-KR" dirty="0">
               <a:solidFill>
                 <a:srgbClr val="92D050"/>
@@ -14479,6 +14459,63 @@
           </a:p>
         </p:txBody>
       </p:sp>
+      <p:graphicFrame>
+        <p:nvGraphicFramePr>
+          <p:cNvPr id="3" name="개체 2"/>
+          <p:cNvGraphicFramePr>
+            <a:graphicFrameLocks noChangeAspect="1"/>
+          </p:cNvGraphicFramePr>
+          <p:nvPr>
+            <p:extLst>
+              <p:ext uri="{D42A27DB-BD31-4B8C-83A1-F6EECF244321}">
+                <p14:modId xmlns:p14="http://schemas.microsoft.com/office/powerpoint/2010/main" val="3064535128"/>
+              </p:ext>
+            </p:extLst>
+          </p:nvPr>
+        </p:nvGraphicFramePr>
+        <p:xfrm>
+          <a:off x="1557196" y="1768104"/>
+          <a:ext cx="1810693" cy="1064237"/>
+        </p:xfrm>
+        <a:graphic>
+          <a:graphicData uri="http://schemas.openxmlformats.org/presentationml/2006/ole">
+            <mc:AlternateContent xmlns:mc="http://schemas.openxmlformats.org/markup-compatibility/2006">
+              <mc:Choice xmlns:v="urn:schemas-microsoft-com:vml" Requires="v">
+                <p:oleObj spid="_x0000_s1026" name="워크시트" showAsIcon="1" r:id="rId3" imgW="922680" imgH="964440" progId="Excel.Sheet.12">
+                  <p:link updateAutomatic="1"/>
+                </p:oleObj>
+              </mc:Choice>
+              <mc:Fallback>
+                <p:oleObj name="워크시트" showAsIcon="1" r:id="rId3" imgW="922680" imgH="964440" progId="Excel.Sheet.12">
+                  <p:link updateAutomatic="1"/>
+                  <p:pic>
+                    <p:nvPicPr>
+                      <p:cNvPr id="0" name=""/>
+                      <p:cNvPicPr/>
+                      <p:nvPr/>
+                    </p:nvPicPr>
+                    <p:blipFill>
+                      <a:blip r:embed="rId4"/>
+                      <a:stretch>
+                        <a:fillRect/>
+                      </a:stretch>
+                    </p:blipFill>
+                    <p:spPr>
+                      <a:xfrm>
+                        <a:off x="1557196" y="1768104"/>
+                        <a:ext cx="1810693" cy="1064237"/>
+                      </a:xfrm>
+                      <a:prstGeom prst="rect">
+                        <a:avLst/>
+                      </a:prstGeom>
+                    </p:spPr>
+                  </p:pic>
+                </p:oleObj>
+              </mc:Fallback>
+            </mc:AlternateContent>
+          </a:graphicData>
+        </a:graphic>
+      </p:graphicFrame>
     </p:spTree>
     <p:extLst>
       <p:ext uri="{BB962C8B-B14F-4D97-AF65-F5344CB8AC3E}">
@@ -31050,8 +31087,8 @@
             <a:r>
               <a:rPr lang="en-US" altLang="ko-KR" b="1" dirty="0" smtClean="0">
                 <a:solidFill>
-                  <a:schemeClr val="bg2">
-                    <a:lumMod val="75000"/>
+                  <a:schemeClr val="accent2">
+                    <a:lumMod val="50000"/>
                   </a:schemeClr>
                 </a:solidFill>
                 <a:latin typeface="Noto Sans KR SemiBold" panose="020B0200000000000000" pitchFamily="50" charset="-127"/>
@@ -31062,8 +31099,8 @@
             <a:r>
               <a:rPr lang="ko-KR" altLang="en-US" b="1" dirty="0" smtClean="0">
                 <a:solidFill>
-                  <a:schemeClr val="bg2">
-                    <a:lumMod val="75000"/>
+                  <a:schemeClr val="accent2">
+                    <a:lumMod val="50000"/>
                   </a:schemeClr>
                 </a:solidFill>
                 <a:latin typeface="Noto Sans KR SemiBold" panose="020B0200000000000000" pitchFamily="50" charset="-127"/>
@@ -31074,8 +31111,8 @@
             <a:r>
               <a:rPr lang="en-US" altLang="ko-KR" b="1" dirty="0" smtClean="0">
                 <a:solidFill>
-                  <a:schemeClr val="bg2">
-                    <a:lumMod val="75000"/>
+                  <a:schemeClr val="accent2">
+                    <a:lumMod val="50000"/>
                   </a:schemeClr>
                 </a:solidFill>
                 <a:latin typeface="Noto Sans KR SemiBold" panose="020B0200000000000000" pitchFamily="50" charset="-127"/>
@@ -31086,8 +31123,8 @@
             <a:r>
               <a:rPr lang="ko-KR" altLang="en-US" b="1" dirty="0" smtClean="0">
                 <a:solidFill>
-                  <a:schemeClr val="bg2">
-                    <a:lumMod val="75000"/>
+                  <a:schemeClr val="accent2">
+                    <a:lumMod val="50000"/>
                   </a:schemeClr>
                 </a:solidFill>
                 <a:latin typeface="Noto Sans KR SemiBold" panose="020B0200000000000000" pitchFamily="50" charset="-127"/>
@@ -31097,8 +31134,8 @@
             </a:r>
             <a:endParaRPr lang="en-US" altLang="ko-KR" b="1" dirty="0" smtClean="0">
               <a:solidFill>
-                <a:schemeClr val="bg2">
-                  <a:lumMod val="75000"/>
+                <a:schemeClr val="accent2">
+                  <a:lumMod val="50000"/>
                 </a:schemeClr>
               </a:solidFill>
               <a:latin typeface="Noto Sans KR SemiBold" panose="020B0200000000000000" pitchFamily="50" charset="-127"/>
@@ -31198,8 +31235,8 @@
             <a:r>
               <a:rPr lang="en-US" altLang="ko-KR" b="1" dirty="0" smtClean="0">
                 <a:solidFill>
-                  <a:schemeClr val="bg2">
-                    <a:lumMod val="75000"/>
+                  <a:schemeClr val="accent2">
+                    <a:lumMod val="50000"/>
                   </a:schemeClr>
                 </a:solidFill>
                 <a:latin typeface="Noto Sans KR SemiBold" panose="020B0200000000000000" pitchFamily="50" charset="-127"/>
@@ -31210,8 +31247,8 @@
             <a:r>
               <a:rPr lang="ko-KR" altLang="en-US" b="1" dirty="0" smtClean="0">
                 <a:solidFill>
-                  <a:schemeClr val="bg2">
-                    <a:lumMod val="75000"/>
+                  <a:schemeClr val="accent2">
+                    <a:lumMod val="50000"/>
                   </a:schemeClr>
                 </a:solidFill>
                 <a:latin typeface="Noto Sans KR SemiBold" panose="020B0200000000000000" pitchFamily="50" charset="-127"/>
@@ -31222,8 +31259,8 @@
             <a:r>
               <a:rPr lang="en-US" altLang="ko-KR" b="1" dirty="0" smtClean="0">
                 <a:solidFill>
-                  <a:schemeClr val="bg2">
-                    <a:lumMod val="75000"/>
+                  <a:schemeClr val="accent2">
+                    <a:lumMod val="50000"/>
                   </a:schemeClr>
                 </a:solidFill>
                 <a:latin typeface="Noto Sans KR SemiBold" panose="020B0200000000000000" pitchFamily="50" charset="-127"/>
@@ -31234,8 +31271,8 @@
             <a:r>
               <a:rPr lang="ko-KR" altLang="en-US" b="1" dirty="0">
                 <a:solidFill>
-                  <a:schemeClr val="bg2">
-                    <a:lumMod val="75000"/>
+                  <a:schemeClr val="accent2">
+                    <a:lumMod val="50000"/>
                   </a:schemeClr>
                 </a:solidFill>
                 <a:latin typeface="Noto Sans KR SemiBold" panose="020B0200000000000000" pitchFamily="50" charset="-127"/>
@@ -31246,8 +31283,8 @@
             <a:r>
               <a:rPr lang="ko-KR" altLang="en-US" b="1" dirty="0" smtClean="0">
                 <a:solidFill>
-                  <a:schemeClr val="bg2">
-                    <a:lumMod val="75000"/>
+                  <a:schemeClr val="accent2">
+                    <a:lumMod val="50000"/>
                   </a:schemeClr>
                 </a:solidFill>
                 <a:latin typeface="Noto Sans KR SemiBold" panose="020B0200000000000000" pitchFamily="50" charset="-127"/>
@@ -31257,8 +31294,8 @@
             </a:r>
             <a:endParaRPr lang="en-US" altLang="ko-KR" b="1" dirty="0" smtClean="0">
               <a:solidFill>
-                <a:schemeClr val="bg2">
-                  <a:lumMod val="75000"/>
+                <a:schemeClr val="accent2">
+                  <a:lumMod val="50000"/>
                 </a:schemeClr>
               </a:solidFill>
               <a:latin typeface="Noto Sans KR SemiBold" panose="020B0200000000000000" pitchFamily="50" charset="-127"/>
@@ -31418,8 +31455,8 @@
             <a:r>
               <a:rPr lang="en-US" altLang="ko-KR" b="1" dirty="0" smtClean="0">
                 <a:solidFill>
-                  <a:schemeClr val="bg2">
-                    <a:lumMod val="75000"/>
+                  <a:schemeClr val="accent2">
+                    <a:lumMod val="50000"/>
                   </a:schemeClr>
                 </a:solidFill>
                 <a:latin typeface="Noto Sans KR SemiBold" panose="020B0200000000000000" pitchFamily="50" charset="-127"/>
@@ -31430,8 +31467,8 @@
             <a:r>
               <a:rPr lang="ko-KR" altLang="en-US" b="1" dirty="0" smtClean="0">
                 <a:solidFill>
-                  <a:schemeClr val="bg2">
-                    <a:lumMod val="75000"/>
+                  <a:schemeClr val="accent2">
+                    <a:lumMod val="50000"/>
                   </a:schemeClr>
                 </a:solidFill>
                 <a:latin typeface="Noto Sans KR SemiBold" panose="020B0200000000000000" pitchFamily="50" charset="-127"/>
@@ -31442,8 +31479,8 @@
             <a:r>
               <a:rPr lang="en-US" altLang="ko-KR" b="1" dirty="0" smtClean="0">
                 <a:solidFill>
-                  <a:schemeClr val="bg2">
-                    <a:lumMod val="75000"/>
+                  <a:schemeClr val="accent2">
+                    <a:lumMod val="50000"/>
                   </a:schemeClr>
                 </a:solidFill>
                 <a:latin typeface="Noto Sans KR SemiBold" panose="020B0200000000000000" pitchFamily="50" charset="-127"/>
@@ -31454,8 +31491,8 @@
             <a:r>
               <a:rPr lang="ko-KR" altLang="en-US" b="1" dirty="0" smtClean="0">
                 <a:solidFill>
-                  <a:schemeClr val="bg2">
-                    <a:lumMod val="75000"/>
+                  <a:schemeClr val="accent2">
+                    <a:lumMod val="50000"/>
                   </a:schemeClr>
                 </a:solidFill>
                 <a:latin typeface="Noto Sans KR SemiBold" panose="020B0200000000000000" pitchFamily="50" charset="-127"/>
@@ -31465,8 +31502,8 @@
             </a:r>
             <a:endParaRPr lang="en-US" altLang="ko-KR" b="1" dirty="0" smtClean="0">
               <a:solidFill>
-                <a:schemeClr val="bg2">
-                  <a:lumMod val="75000"/>
+                <a:schemeClr val="accent2">
+                  <a:lumMod val="50000"/>
                 </a:schemeClr>
               </a:solidFill>
               <a:latin typeface="Noto Sans KR SemiBold" panose="020B0200000000000000" pitchFamily="50" charset="-127"/>
@@ -31556,7 +31593,7 @@
             <a:r>
               <a:rPr lang="en-US" altLang="ko-KR" b="1" dirty="0" smtClean="0">
                 <a:solidFill>
-                  <a:schemeClr val="accent1">
+                  <a:schemeClr val="accent2">
                     <a:lumMod val="50000"/>
                   </a:schemeClr>
                 </a:solidFill>
@@ -31568,7 +31605,7 @@
             <a:r>
               <a:rPr lang="ko-KR" altLang="en-US" b="1" dirty="0" smtClean="0">
                 <a:solidFill>
-                  <a:schemeClr val="accent1">
+                  <a:schemeClr val="accent2">
                     <a:lumMod val="50000"/>
                   </a:schemeClr>
                 </a:solidFill>
@@ -31580,7 +31617,7 @@
             <a:r>
               <a:rPr lang="en-US" altLang="ko-KR" b="1" dirty="0" smtClean="0">
                 <a:solidFill>
-                  <a:schemeClr val="accent1">
+                  <a:schemeClr val="accent2">
                     <a:lumMod val="50000"/>
                   </a:schemeClr>
                 </a:solidFill>
@@ -31592,7 +31629,7 @@
             <a:r>
               <a:rPr lang="ko-KR" altLang="en-US" b="1" dirty="0" smtClean="0">
                 <a:solidFill>
-                  <a:schemeClr val="accent1">
+                  <a:schemeClr val="accent2">
                     <a:lumMod val="50000"/>
                   </a:schemeClr>
                 </a:solidFill>
@@ -31603,7 +31640,7 @@
             </a:r>
             <a:endParaRPr lang="en-US" altLang="ko-KR" b="1" dirty="0" smtClean="0">
               <a:solidFill>
-                <a:schemeClr val="accent1">
+                <a:schemeClr val="accent2">
                   <a:lumMod val="50000"/>
                 </a:schemeClr>
               </a:solidFill>
@@ -35928,7 +35965,7 @@
         <a:font script="Geor" typeface="Sylfaen"/>
       </a:minorFont>
     </a:fontScheme>
-    <a:fmtScheme name="우윳빛 유리">
+    <a:fmtScheme name="슬라이스">
       <a:fillStyleLst>
         <a:solidFill>
           <a:schemeClr val="phClr"/>
@@ -35937,89 +35974,61 @@
           <a:gsLst>
             <a:gs pos="0">
               <a:schemeClr val="phClr">
-                <a:tint val="15000"/>
-                <a:satMod val="250000"/>
-              </a:schemeClr>
-            </a:gs>
-            <a:gs pos="49000">
-              <a:schemeClr val="phClr">
-                <a:tint val="50000"/>
-                <a:satMod val="200000"/>
-              </a:schemeClr>
-            </a:gs>
-            <a:gs pos="49100">
-              <a:schemeClr val="phClr">
-                <a:tint val="64000"/>
-                <a:satMod val="160000"/>
-              </a:schemeClr>
-            </a:gs>
-            <a:gs pos="92000">
-              <a:schemeClr val="phClr">
-                <a:tint val="50000"/>
-                <a:satMod val="200000"/>
+                <a:tint val="62000"/>
+                <a:hueMod val="94000"/>
+                <a:satMod val="140000"/>
+                <a:lumMod val="110000"/>
               </a:schemeClr>
             </a:gs>
             <a:gs pos="100000">
               <a:schemeClr val="phClr">
-                <a:tint val="43000"/>
-                <a:satMod val="190000"/>
+                <a:tint val="84000"/>
+                <a:satMod val="160000"/>
               </a:schemeClr>
             </a:gs>
           </a:gsLst>
-          <a:lin ang="5400000" scaled="1"/>
+          <a:lin ang="5400000" scaled="0"/>
         </a:gradFill>
         <a:gradFill rotWithShape="1">
           <a:gsLst>
             <a:gs pos="0">
               <a:schemeClr val="phClr">
-                <a:tint val="74000"/>
-              </a:schemeClr>
-            </a:gs>
-            <a:gs pos="49000">
-              <a:schemeClr val="phClr">
-                <a:tint val="96000"/>
-                <a:shade val="84000"/>
-                <a:satMod val="110000"/>
-              </a:schemeClr>
-            </a:gs>
-            <a:gs pos="49100">
-              <a:schemeClr val="phClr">
-                <a:shade val="55000"/>
-                <a:satMod val="150000"/>
-              </a:schemeClr>
-            </a:gs>
-            <a:gs pos="92000">
-              <a:schemeClr val="phClr">
                 <a:tint val="98000"/>
-                <a:shade val="90000"/>
-                <a:satMod val="128000"/>
+                <a:hueMod val="94000"/>
+                <a:satMod val="130000"/>
+                <a:lumMod val="128000"/>
               </a:schemeClr>
             </a:gs>
             <a:gs pos="100000">
               <a:schemeClr val="phClr">
-                <a:tint val="90000"/>
-                <a:shade val="97000"/>
-                <a:satMod val="128000"/>
+                <a:shade val="94000"/>
+                <a:lumMod val="88000"/>
               </a:schemeClr>
             </a:gs>
           </a:gsLst>
-          <a:lin ang="5400000" scaled="1"/>
+          <a:lin ang="5400000" scaled="0"/>
         </a:gradFill>
       </a:fillStyleLst>
       <a:lnStyleLst>
-        <a:ln w="11430" cap="flat" cmpd="sng" algn="ctr">
+        <a:ln w="9525" cap="rnd" cmpd="sng" algn="ctr">
           <a:solidFill>
-            <a:schemeClr val="phClr"/>
+            <a:schemeClr val="phClr">
+              <a:tint val="76000"/>
+              <a:alpha val="60000"/>
+              <a:hueMod val="94000"/>
+            </a:schemeClr>
           </a:solidFill>
           <a:prstDash val="solid"/>
         </a:ln>
-        <a:ln w="40000" cap="flat" cmpd="sng" algn="ctr">
+        <a:ln w="15875" cap="rnd" cmpd="sng" algn="ctr">
           <a:solidFill>
-            <a:schemeClr val="phClr"/>
+            <a:schemeClr val="phClr">
+              <a:hueMod val="94000"/>
+            </a:schemeClr>
           </a:solidFill>
           <a:prstDash val="solid"/>
         </a:ln>
-        <a:ln w="31800" cap="flat" cmpd="sng" algn="ctr">
+        <a:ln w="28575" cap="rnd" cmpd="sng" algn="ctr">
           <a:solidFill>
             <a:schemeClr val="phClr"/>
           </a:solidFill>
@@ -36028,45 +36037,33 @@
       </a:lnStyleLst>
       <a:effectStyleLst>
         <a:effectStyle>
+          <a:effectLst/>
+        </a:effectStyle>
+        <a:effectStyle>
           <a:effectLst>
-            <a:outerShdw blurRad="50800" dist="25000" dir="5400000" rotWithShape="0">
-              <a:schemeClr val="phClr">
-                <a:shade val="30000"/>
-                <a:satMod val="150000"/>
-                <a:alpha val="38000"/>
-              </a:schemeClr>
-            </a:outerShdw>
+            <a:innerShdw blurRad="25400" dist="12700" dir="13500000">
+              <a:srgbClr val="000000">
+                <a:alpha val="45000"/>
+              </a:srgbClr>
+            </a:innerShdw>
           </a:effectLst>
         </a:effectStyle>
         <a:effectStyle>
           <a:effectLst>
-            <a:outerShdw blurRad="39000" dist="25400" dir="5400000" rotWithShape="0">
-              <a:schemeClr val="phClr">
-                <a:shade val="33000"/>
-                <a:alpha val="83000"/>
-              </a:schemeClr>
-            </a:outerShdw>
-          </a:effectLst>
-        </a:effectStyle>
-        <a:effectStyle>
-          <a:effectLst>
-            <a:outerShdw blurRad="39000" dist="25400" dir="5400000" rotWithShape="0">
-              <a:schemeClr val="phClr">
-                <a:shade val="33000"/>
-                <a:alpha val="83000"/>
-              </a:schemeClr>
+            <a:outerShdw blurRad="50800" dist="38100" dir="5400000" rotWithShape="0">
+              <a:srgbClr val="000000">
+                <a:alpha val="46000"/>
+              </a:srgbClr>
             </a:outerShdw>
           </a:effectLst>
           <a:scene3d>
-            <a:camera prst="orthographicFront" fov="0">
+            <a:camera prst="orthographicFront">
               <a:rot lat="0" lon="0" rev="0"/>
             </a:camera>
-            <a:lightRig rig="contrasting" dir="t">
-              <a:rot lat="0" lon="0" rev="1500000"/>
-            </a:lightRig>
+            <a:lightRig rig="threePt" dir="t"/>
           </a:scene3d>
-          <a:sp3d extrusionH="127000" prstMaterial="powder">
-            <a:bevelT w="50800" h="63500"/>
+          <a:sp3d prstMaterial="plastic">
+            <a:bevelT w="25400" h="25400"/>
           </a:sp3d>
         </a:effectStyle>
       </a:effectStyleLst>

</xml_diff>